<commit_message>
add minfo_folder for an input option
</commit_message>
<xml_diff>
--- a/doc/MakePES/usage_MakePES.pptx
+++ b/doc/MakePES/usage_MakePES.pptx
@@ -266,7 +266,7 @@
           <a:p>
             <a:fld id="{E169DC26-B38B-F143-8CF0-891C5D30D367}" type="datetimeFigureOut">
               <a:rPr kumimoji="1" lang="ja-JP" altLang="en-US" smtClean="0"/>
-              <a:t>2019/11/13</a:t>
+              <a:t>2019/12/9</a:t>
             </a:fld>
             <a:endParaRPr kumimoji="1" lang="ja-JP" altLang="en-US"/>
           </a:p>
@@ -780,7 +780,7 @@
           <a:p>
             <a:fld id="{EE7860AB-3E3A-634E-9588-3634E3BE52A0}" type="datetime1">
               <a:rPr kumimoji="1" lang="ja-JP" altLang="en-US" smtClean="0"/>
-              <a:t>2019/11/13</a:t>
+              <a:t>2019/12/9</a:t>
             </a:fld>
             <a:endParaRPr kumimoji="1" lang="ja-JP" altLang="en-US"/>
           </a:p>
@@ -977,7 +977,7 @@
           <a:p>
             <a:fld id="{9F997464-49D2-A046-AC0E-5FDFD3DF665B}" type="datetime1">
               <a:rPr kumimoji="1" lang="ja-JP" altLang="en-US" smtClean="0"/>
-              <a:t>2019/11/13</a:t>
+              <a:t>2019/12/9</a:t>
             </a:fld>
             <a:endParaRPr kumimoji="1" lang="ja-JP" altLang="en-US"/>
           </a:p>
@@ -1184,7 +1184,7 @@
           <a:p>
             <a:fld id="{2CBD1245-BC8C-4342-A14F-D901B9B13210}" type="datetime1">
               <a:rPr kumimoji="1" lang="ja-JP" altLang="en-US" smtClean="0"/>
-              <a:t>2019/11/13</a:t>
+              <a:t>2019/12/9</a:t>
             </a:fld>
             <a:endParaRPr kumimoji="1" lang="ja-JP" altLang="en-US"/>
           </a:p>
@@ -1381,7 +1381,7 @@
           <a:p>
             <a:fld id="{E0FF5DFC-0E6C-E144-A5DD-E851AA0EE050}" type="datetime1">
               <a:rPr kumimoji="1" lang="ja-JP" altLang="en-US" smtClean="0"/>
-              <a:t>2019/11/13</a:t>
+              <a:t>2019/12/9</a:t>
             </a:fld>
             <a:endParaRPr kumimoji="1" lang="ja-JP" altLang="en-US"/>
           </a:p>
@@ -1620,7 +1620,7 @@
           <a:p>
             <a:fld id="{1373E6F4-CB37-3348-B268-694CC61CFDE2}" type="datetime1">
               <a:rPr kumimoji="1" lang="ja-JP" altLang="en-US" smtClean="0"/>
-              <a:t>2019/11/13</a:t>
+              <a:t>2019/12/9</a:t>
             </a:fld>
             <a:endParaRPr kumimoji="1" lang="ja-JP" altLang="en-US"/>
           </a:p>
@@ -1911,7 +1911,7 @@
           <a:p>
             <a:fld id="{83203CE9-A62D-D54F-B5B8-E5081BC50FF5}" type="datetime1">
               <a:rPr kumimoji="1" lang="ja-JP" altLang="en-US" smtClean="0"/>
-              <a:t>2019/11/13</a:t>
+              <a:t>2019/12/9</a:t>
             </a:fld>
             <a:endParaRPr kumimoji="1" lang="ja-JP" altLang="en-US"/>
           </a:p>
@@ -2337,7 +2337,7 @@
           <a:p>
             <a:fld id="{8DF792D3-1EAE-B941-8FA8-A45BDC58D538}" type="datetime1">
               <a:rPr kumimoji="1" lang="ja-JP" altLang="en-US" smtClean="0"/>
-              <a:t>2019/11/13</a:t>
+              <a:t>2019/12/9</a:t>
             </a:fld>
             <a:endParaRPr kumimoji="1" lang="ja-JP" altLang="en-US"/>
           </a:p>
@@ -2450,7 +2450,7 @@
           <a:p>
             <a:fld id="{A2976D4D-D591-7843-A186-DB885C000B62}" type="datetime1">
               <a:rPr kumimoji="1" lang="ja-JP" altLang="en-US" smtClean="0"/>
-              <a:t>2019/11/13</a:t>
+              <a:t>2019/12/9</a:t>
             </a:fld>
             <a:endParaRPr kumimoji="1" lang="ja-JP" altLang="en-US"/>
           </a:p>
@@ -2540,7 +2540,7 @@
           <a:p>
             <a:fld id="{71E10034-284E-534E-87ED-A26A40A9A5A4}" type="datetime1">
               <a:rPr kumimoji="1" lang="ja-JP" altLang="en-US" smtClean="0"/>
-              <a:t>2019/11/13</a:t>
+              <a:t>2019/12/9</a:t>
             </a:fld>
             <a:endParaRPr kumimoji="1" lang="ja-JP" altLang="en-US"/>
           </a:p>
@@ -2844,7 +2844,7 @@
           <a:p>
             <a:fld id="{1FB2FB92-4CFC-BF4B-81B2-16888C599581}" type="datetime1">
               <a:rPr kumimoji="1" lang="ja-JP" altLang="en-US" smtClean="0"/>
-              <a:t>2019/11/13</a:t>
+              <a:t>2019/12/9</a:t>
             </a:fld>
             <a:endParaRPr kumimoji="1" lang="ja-JP" altLang="en-US"/>
           </a:p>
@@ -3096,7 +3096,7 @@
           <a:p>
             <a:fld id="{43AF2432-0CDD-C544-BAB3-85372DA356EC}" type="datetime1">
               <a:rPr kumimoji="1" lang="ja-JP" altLang="en-US" smtClean="0"/>
-              <a:t>2019/11/13</a:t>
+              <a:t>2019/12/9</a:t>
             </a:fld>
             <a:endParaRPr kumimoji="1" lang="ja-JP" altLang="en-US"/>
           </a:p>
@@ -3336,7 +3336,7 @@
           <a:p>
             <a:fld id="{4A801117-FCED-794E-BE88-16E7FC9A3D9F}" type="datetime1">
               <a:rPr kumimoji="1" lang="ja-JP" altLang="en-US" smtClean="0"/>
-              <a:t>2019/11/13</a:t>
+              <a:t>2019/12/9</a:t>
             </a:fld>
             <a:endParaRPr kumimoji="1" lang="ja-JP" altLang="en-US"/>
           </a:p>
@@ -31190,7 +31190,7 @@
         <p:spPr>
           <a:xfrm>
             <a:off x="914401" y="1130023"/>
-            <a:ext cx="7827665" cy="2523768"/>
+            <a:ext cx="7827665" cy="3170099"/>
           </a:xfrm>
           <a:prstGeom prst="rect">
             <a:avLst/>
@@ -31261,6 +31261,54 @@
           </a:p>
           <a:p>
             <a:pPr lvl="2">
+              <a:defRPr/>
+            </a:pPr>
+            <a:endParaRPr lang="en-US" altLang="ja-JP" sz="1400" dirty="0"/>
+          </a:p>
+          <a:p>
+            <a:pPr marL="285750" indent="-285750">
+              <a:buFont typeface="Arial" charset="0"/>
+              <a:buChar char="•"/>
+              <a:defRPr/>
+            </a:pPr>
+            <a:r>
+              <a:rPr lang="en-US" altLang="ja-JP" sz="1400" dirty="0" err="1"/>
+              <a:t>minfo_folder</a:t>
+            </a:r>
+            <a:r>
+              <a:rPr lang="en-US" altLang="ja-JP" sz="1400" dirty="0"/>
+              <a:t>: folder name</a:t>
+            </a:r>
+          </a:p>
+          <a:p>
+            <a:pPr lvl="1">
+              <a:defRPr/>
+            </a:pPr>
+            <a:r>
+              <a:rPr lang="en-US" altLang="ja-JP" sz="1400" dirty="0"/>
+              <a:t>The name of a folder where generated </a:t>
+            </a:r>
+            <a:r>
+              <a:rPr lang="en-US" altLang="ja-JP" sz="1400" dirty="0" err="1"/>
+              <a:t>minfo</a:t>
+            </a:r>
+            <a:r>
+              <a:rPr lang="en-US" altLang="ja-JP" sz="1400" dirty="0"/>
+              <a:t> files will be stored. The value is </a:t>
+            </a:r>
+            <a:r>
+              <a:rPr lang="en-US" altLang="ja-JP" sz="1400" u="sng" dirty="0"/>
+              <a:t>case sensitive</a:t>
+            </a:r>
+            <a:r>
+              <a:rPr lang="en-US" altLang="ja-JP" sz="1400" dirty="0"/>
+              <a:t>.</a:t>
+            </a:r>
+          </a:p>
+          <a:p>
+            <a:pPr marL="285750" indent="-285750">
+              <a:buFont typeface="Arial" charset="0"/>
+              <a:buChar char="•"/>
               <a:defRPr/>
             </a:pPr>
             <a:endParaRPr lang="en-US" altLang="ja-JP" sz="1400" dirty="0"/>
@@ -33033,123 +33081,6 @@
           </a:p>
         </p:txBody>
       </p:sp>
-      <mc:AlternateContent xmlns:mc="http://schemas.openxmlformats.org/markup-compatibility/2006" xmlns:a14="http://schemas.microsoft.com/office/drawing/2010/main">
-        <mc:Choice Requires="a14">
-          <p:sp>
-            <p:nvSpPr>
-              <p:cNvPr id="5" name="テキスト ボックス 4">
-                <a:extLst>
-                  <a:ext uri="{FF2B5EF4-FFF2-40B4-BE49-F238E27FC236}">
-                    <a16:creationId xmlns:a16="http://schemas.microsoft.com/office/drawing/2014/main" id="{29C10D37-BF6B-CE40-9CCA-446B3C8FBA8E}"/>
-                  </a:ext>
-                </a:extLst>
-              </p:cNvPr>
-              <p:cNvSpPr txBox="1"/>
-              <p:nvPr/>
-            </p:nvSpPr>
-            <p:spPr>
-              <a:xfrm>
-                <a:off x="2705100" y="5499100"/>
-                <a:ext cx="224677" cy="474361"/>
-              </a:xfrm>
-              <a:prstGeom prst="rect">
-                <a:avLst/>
-              </a:prstGeom>
-              <a:noFill/>
-            </p:spPr>
-            <p:txBody>
-              <a:bodyPr wrap="none" lIns="0" tIns="0" rIns="0" bIns="0" rtlCol="0">
-                <a:spAutoFit/>
-              </a:bodyPr>
-              <a:lstStyle/>
-              <a:p>
-                <a:pPr/>
-                <a14:m>
-                  <m:oMathPara xmlns:m="http://schemas.openxmlformats.org/officeDocument/2006/math">
-                    <m:oMathParaPr>
-                      <m:jc m:val="centerGroup"/>
-                    </m:oMathParaPr>
-                    <m:oMath xmlns:m="http://schemas.openxmlformats.org/officeDocument/2006/math">
-                      <m:f>
-                        <m:fPr>
-                          <m:ctrlPr>
-                            <a:rPr kumimoji="1" lang="en-US" altLang="ja-JP" i="1" smtClean="0">
-                              <a:latin typeface="Cambria Math" panose="02040503050406030204" pitchFamily="18" charset="0"/>
-                            </a:rPr>
-                          </m:ctrlPr>
-                        </m:fPr>
-                        <m:num>
-                          <m:r>
-                            <a:rPr kumimoji="1" lang="en-US" altLang="ja-JP" i="1" smtClean="0">
-                              <a:latin typeface="Cambria Math" panose="02040503050406030204" pitchFamily="18" charset="0"/>
-                              <a:ea typeface="Cambria Math" panose="02040503050406030204" pitchFamily="18" charset="0"/>
-                            </a:rPr>
-                            <m:t>𝜔</m:t>
-                          </m:r>
-                        </m:num>
-                        <m:den>
-                          <m:r>
-                            <a:rPr kumimoji="1" lang="en-US" altLang="ja-JP" i="1" smtClean="0">
-                              <a:latin typeface="Cambria Math" panose="02040503050406030204" pitchFamily="18" charset="0"/>
-                              <a:ea typeface="Cambria Math" panose="02040503050406030204" pitchFamily="18" charset="0"/>
-                            </a:rPr>
-                            <m:t>ℏ</m:t>
-                          </m:r>
-                        </m:den>
-                      </m:f>
-                    </m:oMath>
-                  </m:oMathPara>
-                </a14:m>
-                <a:endParaRPr kumimoji="1" lang="ja-JP" altLang="en-US"/>
-              </a:p>
-            </p:txBody>
-          </p:sp>
-        </mc:Choice>
-        <mc:Fallback xmlns="">
-          <p:sp>
-            <p:nvSpPr>
-              <p:cNvPr id="5" name="テキスト ボックス 4">
-                <a:extLst>
-                  <a:ext uri="{FF2B5EF4-FFF2-40B4-BE49-F238E27FC236}">
-                    <a16:creationId xmlns:a16="http://schemas.microsoft.com/office/drawing/2014/main" id="{29C10D37-BF6B-CE40-9CCA-446B3C8FBA8E}"/>
-                  </a:ext>
-                </a:extLst>
-              </p:cNvPr>
-              <p:cNvSpPr txBox="1">
-                <a:spLocks noRot="1" noChangeAspect="1" noMove="1" noResize="1" noEditPoints="1" noAdjustHandles="1" noChangeArrowheads="1" noChangeShapeType="1" noTextEdit="1"/>
-              </p:cNvSpPr>
-              <p:nvPr/>
-            </p:nvSpPr>
-            <p:spPr>
-              <a:xfrm>
-                <a:off x="2705100" y="5499100"/>
-                <a:ext cx="224677" cy="474361"/>
-              </a:xfrm>
-              <a:prstGeom prst="rect">
-                <a:avLst/>
-              </a:prstGeom>
-              <a:blipFill>
-                <a:blip r:embed="rId2"/>
-                <a:stretch>
-                  <a:fillRect l="-15789" r="-10526" b="-15789"/>
-                </a:stretch>
-              </a:blipFill>
-            </p:spPr>
-            <p:txBody>
-              <a:bodyPr/>
-              <a:lstStyle/>
-              <a:p>
-                <a:r>
-                  <a:rPr lang="ja-JP" altLang="en-US">
-                    <a:noFill/>
-                  </a:rPr>
-                  <a:t> </a:t>
-                </a:r>
-              </a:p>
-            </p:txBody>
-          </p:sp>
-        </mc:Fallback>
-      </mc:AlternateContent>
     </p:spTree>
     <p:extLst>
       <p:ext uri="{BB962C8B-B14F-4D97-AF65-F5344CB8AC3E}">

</xml_diff>

<commit_message>
add MR option to each PES type
</commit_message>
<xml_diff>
--- a/doc/MakePES/usage_MakePES.pptx
+++ b/doc/MakePES/usage_MakePES.pptx
@@ -267,7 +267,7 @@
           <a:p>
             <a:fld id="{E169DC26-B38B-F143-8CF0-891C5D30D367}" type="datetimeFigureOut">
               <a:rPr kumimoji="1" lang="ja-JP" altLang="en-US" smtClean="0"/>
-              <a:t>2019/12/13</a:t>
+              <a:t>2020/4/15</a:t>
             </a:fld>
             <a:endParaRPr kumimoji="1" lang="ja-JP" altLang="en-US"/>
           </a:p>
@@ -781,7 +781,7 @@
           <a:p>
             <a:fld id="{EE7860AB-3E3A-634E-9588-3634E3BE52A0}" type="datetime1">
               <a:rPr kumimoji="1" lang="ja-JP" altLang="en-US" smtClean="0"/>
-              <a:t>2019/12/13</a:t>
+              <a:t>2020/4/15</a:t>
             </a:fld>
             <a:endParaRPr kumimoji="1" lang="ja-JP" altLang="en-US"/>
           </a:p>
@@ -978,7 +978,7 @@
           <a:p>
             <a:fld id="{9F997464-49D2-A046-AC0E-5FDFD3DF665B}" type="datetime1">
               <a:rPr kumimoji="1" lang="ja-JP" altLang="en-US" smtClean="0"/>
-              <a:t>2019/12/13</a:t>
+              <a:t>2020/4/15</a:t>
             </a:fld>
             <a:endParaRPr kumimoji="1" lang="ja-JP" altLang="en-US"/>
           </a:p>
@@ -1185,7 +1185,7 @@
           <a:p>
             <a:fld id="{2CBD1245-BC8C-4342-A14F-D901B9B13210}" type="datetime1">
               <a:rPr kumimoji="1" lang="ja-JP" altLang="en-US" smtClean="0"/>
-              <a:t>2019/12/13</a:t>
+              <a:t>2020/4/15</a:t>
             </a:fld>
             <a:endParaRPr kumimoji="1" lang="ja-JP" altLang="en-US"/>
           </a:p>
@@ -1382,7 +1382,7 @@
           <a:p>
             <a:fld id="{E0FF5DFC-0E6C-E144-A5DD-E851AA0EE050}" type="datetime1">
               <a:rPr kumimoji="1" lang="ja-JP" altLang="en-US" smtClean="0"/>
-              <a:t>2019/12/13</a:t>
+              <a:t>2020/4/15</a:t>
             </a:fld>
             <a:endParaRPr kumimoji="1" lang="ja-JP" altLang="en-US"/>
           </a:p>
@@ -1621,7 +1621,7 @@
           <a:p>
             <a:fld id="{1373E6F4-CB37-3348-B268-694CC61CFDE2}" type="datetime1">
               <a:rPr kumimoji="1" lang="ja-JP" altLang="en-US" smtClean="0"/>
-              <a:t>2019/12/13</a:t>
+              <a:t>2020/4/15</a:t>
             </a:fld>
             <a:endParaRPr kumimoji="1" lang="ja-JP" altLang="en-US"/>
           </a:p>
@@ -1912,7 +1912,7 @@
           <a:p>
             <a:fld id="{83203CE9-A62D-D54F-B5B8-E5081BC50FF5}" type="datetime1">
               <a:rPr kumimoji="1" lang="ja-JP" altLang="en-US" smtClean="0"/>
-              <a:t>2019/12/13</a:t>
+              <a:t>2020/4/15</a:t>
             </a:fld>
             <a:endParaRPr kumimoji="1" lang="ja-JP" altLang="en-US"/>
           </a:p>
@@ -2338,7 +2338,7 @@
           <a:p>
             <a:fld id="{8DF792D3-1EAE-B941-8FA8-A45BDC58D538}" type="datetime1">
               <a:rPr kumimoji="1" lang="ja-JP" altLang="en-US" smtClean="0"/>
-              <a:t>2019/12/13</a:t>
+              <a:t>2020/4/15</a:t>
             </a:fld>
             <a:endParaRPr kumimoji="1" lang="ja-JP" altLang="en-US"/>
           </a:p>
@@ -2451,7 +2451,7 @@
           <a:p>
             <a:fld id="{A2976D4D-D591-7843-A186-DB885C000B62}" type="datetime1">
               <a:rPr kumimoji="1" lang="ja-JP" altLang="en-US" smtClean="0"/>
-              <a:t>2019/12/13</a:t>
+              <a:t>2020/4/15</a:t>
             </a:fld>
             <a:endParaRPr kumimoji="1" lang="ja-JP" altLang="en-US"/>
           </a:p>
@@ -2541,7 +2541,7 @@
           <a:p>
             <a:fld id="{71E10034-284E-534E-87ED-A26A40A9A5A4}" type="datetime1">
               <a:rPr kumimoji="1" lang="ja-JP" altLang="en-US" smtClean="0"/>
-              <a:t>2019/12/13</a:t>
+              <a:t>2020/4/15</a:t>
             </a:fld>
             <a:endParaRPr kumimoji="1" lang="ja-JP" altLang="en-US"/>
           </a:p>
@@ -2845,7 +2845,7 @@
           <a:p>
             <a:fld id="{1FB2FB92-4CFC-BF4B-81B2-16888C599581}" type="datetime1">
               <a:rPr kumimoji="1" lang="ja-JP" altLang="en-US" smtClean="0"/>
-              <a:t>2019/12/13</a:t>
+              <a:t>2020/4/15</a:t>
             </a:fld>
             <a:endParaRPr kumimoji="1" lang="ja-JP" altLang="en-US"/>
           </a:p>
@@ -3097,7 +3097,7 @@
           <a:p>
             <a:fld id="{43AF2432-0CDD-C544-BAB3-85372DA356EC}" type="datetime1">
               <a:rPr kumimoji="1" lang="ja-JP" altLang="en-US" smtClean="0"/>
-              <a:t>2019/12/13</a:t>
+              <a:t>2020/4/15</a:t>
             </a:fld>
             <a:endParaRPr kumimoji="1" lang="ja-JP" altLang="en-US"/>
           </a:p>
@@ -3337,7 +3337,7 @@
           <a:p>
             <a:fld id="{4A801117-FCED-794E-BE88-16E7FC9A3D9F}" type="datetime1">
               <a:rPr kumimoji="1" lang="ja-JP" altLang="en-US" smtClean="0"/>
-              <a:t>2019/12/13</a:t>
+              <a:t>2020/4/15</a:t>
             </a:fld>
             <a:endParaRPr kumimoji="1" lang="ja-JP" altLang="en-US"/>
           </a:p>
@@ -31299,7 +31299,7 @@
         <p:spPr>
           <a:xfrm>
             <a:off x="914401" y="1130023"/>
-            <a:ext cx="7827665" cy="3385542"/>
+            <a:ext cx="7827665" cy="3600986"/>
           </a:xfrm>
           <a:prstGeom prst="rect">
             <a:avLst/>
@@ -31438,7 +31438,7 @@
             </a:pPr>
             <a:r>
               <a:rPr lang="en-US" altLang="ja-JP" sz="1400" dirty="0"/>
-              <a:t>MR:  1/2/3</a:t>
+              <a:t>MR:</a:t>
             </a:r>
           </a:p>
           <a:p>
@@ -31447,8 +31447,21 @@
             </a:pPr>
             <a:r>
               <a:rPr lang="en-US" altLang="ja-JP" sz="1400" dirty="0"/>
-              <a:t>The order of mode coupling expansion. Can take 1, 2, or 3. (default = 3) </a:t>
-            </a:r>
+              <a:t>The order of mode coupling expansion. </a:t>
+            </a:r>
+            <a:r>
+              <a:rPr lang="en-US" altLang="ja-JP" sz="1400"/>
+              <a:t>Each PES type can take its own MR, which precedes the MR here. (</a:t>
+            </a:r>
+            <a:r>
+              <a:rPr lang="en-US" altLang="ja-JP" sz="1400" dirty="0"/>
+              <a:t>default = </a:t>
+            </a:r>
+            <a:r>
+              <a:rPr lang="en-US" altLang="ja-JP" sz="1400"/>
+              <a:t>3)</a:t>
+            </a:r>
+            <a:endParaRPr lang="en-US" altLang="ja-JP" sz="1400" dirty="0"/>
           </a:p>
           <a:p>
             <a:pPr lvl="2">
@@ -32957,7 +32970,7 @@
         <p:spPr>
           <a:xfrm>
             <a:off x="914401" y="232637"/>
-            <a:ext cx="7365999" cy="4569777"/>
+            <a:ext cx="7365999" cy="5170646"/>
           </a:xfrm>
           <a:prstGeom prst="rect">
             <a:avLst/>
@@ -33020,6 +33033,32 @@
             <a:pPr marL="285750" indent="-285750">
               <a:buFont typeface="Arial" charset="0"/>
               <a:buChar char="•"/>
+              <a:defRPr/>
+            </a:pPr>
+            <a:endParaRPr lang="en-US" altLang="ja-JP" sz="1400" dirty="0"/>
+          </a:p>
+          <a:p>
+            <a:pPr marL="285750" indent="-285750">
+              <a:buFont typeface="Arial" charset="0"/>
+              <a:buChar char="•"/>
+              <a:defRPr/>
+            </a:pPr>
+            <a:r>
+              <a:rPr lang="en-US" altLang="ja-JP" sz="1400" dirty="0"/>
+              <a:t>MR:</a:t>
+            </a:r>
+          </a:p>
+          <a:p>
+            <a:pPr lvl="1">
+              <a:defRPr/>
+            </a:pPr>
+            <a:r>
+              <a:rPr lang="en-US" altLang="ja-JP" sz="1400" dirty="0"/>
+              <a:t>The order of mode coupling expansion. Maximum is 4. (default = 3)</a:t>
+            </a:r>
+          </a:p>
+          <a:p>
+            <a:pPr lvl="1">
               <a:defRPr/>
             </a:pPr>
             <a:endParaRPr lang="en-US" altLang="ja-JP" sz="1400" dirty="0"/>

</xml_diff>

<commit_message>
update Usage of MakePES
</commit_message>
<xml_diff>
--- a/doc/MakePES/usage_MakePES.pptx
+++ b/doc/MakePES/usage_MakePES.pptx
@@ -267,7 +267,7 @@
           <a:p>
             <a:fld id="{E169DC26-B38B-F143-8CF0-891C5D30D367}" type="datetimeFigureOut">
               <a:rPr kumimoji="1" lang="ja-JP" altLang="en-US" smtClean="0"/>
-              <a:t>2020/4/15</a:t>
+              <a:t>2020/4/19</a:t>
             </a:fld>
             <a:endParaRPr kumimoji="1" lang="ja-JP" altLang="en-US"/>
           </a:p>
@@ -781,7 +781,7 @@
           <a:p>
             <a:fld id="{EE7860AB-3E3A-634E-9588-3634E3BE52A0}" type="datetime1">
               <a:rPr kumimoji="1" lang="ja-JP" altLang="en-US" smtClean="0"/>
-              <a:t>2020/4/15</a:t>
+              <a:t>2020/4/19</a:t>
             </a:fld>
             <a:endParaRPr kumimoji="1" lang="ja-JP" altLang="en-US"/>
           </a:p>
@@ -978,7 +978,7 @@
           <a:p>
             <a:fld id="{9F997464-49D2-A046-AC0E-5FDFD3DF665B}" type="datetime1">
               <a:rPr kumimoji="1" lang="ja-JP" altLang="en-US" smtClean="0"/>
-              <a:t>2020/4/15</a:t>
+              <a:t>2020/4/19</a:t>
             </a:fld>
             <a:endParaRPr kumimoji="1" lang="ja-JP" altLang="en-US"/>
           </a:p>
@@ -1185,7 +1185,7 @@
           <a:p>
             <a:fld id="{2CBD1245-BC8C-4342-A14F-D901B9B13210}" type="datetime1">
               <a:rPr kumimoji="1" lang="ja-JP" altLang="en-US" smtClean="0"/>
-              <a:t>2020/4/15</a:t>
+              <a:t>2020/4/19</a:t>
             </a:fld>
             <a:endParaRPr kumimoji="1" lang="ja-JP" altLang="en-US"/>
           </a:p>
@@ -1382,7 +1382,7 @@
           <a:p>
             <a:fld id="{E0FF5DFC-0E6C-E144-A5DD-E851AA0EE050}" type="datetime1">
               <a:rPr kumimoji="1" lang="ja-JP" altLang="en-US" smtClean="0"/>
-              <a:t>2020/4/15</a:t>
+              <a:t>2020/4/19</a:t>
             </a:fld>
             <a:endParaRPr kumimoji="1" lang="ja-JP" altLang="en-US"/>
           </a:p>
@@ -1621,7 +1621,7 @@
           <a:p>
             <a:fld id="{1373E6F4-CB37-3348-B268-694CC61CFDE2}" type="datetime1">
               <a:rPr kumimoji="1" lang="ja-JP" altLang="en-US" smtClean="0"/>
-              <a:t>2020/4/15</a:t>
+              <a:t>2020/4/19</a:t>
             </a:fld>
             <a:endParaRPr kumimoji="1" lang="ja-JP" altLang="en-US"/>
           </a:p>
@@ -1912,7 +1912,7 @@
           <a:p>
             <a:fld id="{83203CE9-A62D-D54F-B5B8-E5081BC50FF5}" type="datetime1">
               <a:rPr kumimoji="1" lang="ja-JP" altLang="en-US" smtClean="0"/>
-              <a:t>2020/4/15</a:t>
+              <a:t>2020/4/19</a:t>
             </a:fld>
             <a:endParaRPr kumimoji="1" lang="ja-JP" altLang="en-US"/>
           </a:p>
@@ -2338,7 +2338,7 @@
           <a:p>
             <a:fld id="{8DF792D3-1EAE-B941-8FA8-A45BDC58D538}" type="datetime1">
               <a:rPr kumimoji="1" lang="ja-JP" altLang="en-US" smtClean="0"/>
-              <a:t>2020/4/15</a:t>
+              <a:t>2020/4/19</a:t>
             </a:fld>
             <a:endParaRPr kumimoji="1" lang="ja-JP" altLang="en-US"/>
           </a:p>
@@ -2451,7 +2451,7 @@
           <a:p>
             <a:fld id="{A2976D4D-D591-7843-A186-DB885C000B62}" type="datetime1">
               <a:rPr kumimoji="1" lang="ja-JP" altLang="en-US" smtClean="0"/>
-              <a:t>2020/4/15</a:t>
+              <a:t>2020/4/19</a:t>
             </a:fld>
             <a:endParaRPr kumimoji="1" lang="ja-JP" altLang="en-US"/>
           </a:p>
@@ -2541,7 +2541,7 @@
           <a:p>
             <a:fld id="{71E10034-284E-534E-87ED-A26A40A9A5A4}" type="datetime1">
               <a:rPr kumimoji="1" lang="ja-JP" altLang="en-US" smtClean="0"/>
-              <a:t>2020/4/15</a:t>
+              <a:t>2020/4/19</a:t>
             </a:fld>
             <a:endParaRPr kumimoji="1" lang="ja-JP" altLang="en-US"/>
           </a:p>
@@ -2845,7 +2845,7 @@
           <a:p>
             <a:fld id="{1FB2FB92-4CFC-BF4B-81B2-16888C599581}" type="datetime1">
               <a:rPr kumimoji="1" lang="ja-JP" altLang="en-US" smtClean="0"/>
-              <a:t>2020/4/15</a:t>
+              <a:t>2020/4/19</a:t>
             </a:fld>
             <a:endParaRPr kumimoji="1" lang="ja-JP" altLang="en-US"/>
           </a:p>
@@ -3097,7 +3097,7 @@
           <a:p>
             <a:fld id="{43AF2432-0CDD-C544-BAB3-85372DA356EC}" type="datetime1">
               <a:rPr kumimoji="1" lang="ja-JP" altLang="en-US" smtClean="0"/>
-              <a:t>2020/4/15</a:t>
+              <a:t>2020/4/19</a:t>
             </a:fld>
             <a:endParaRPr kumimoji="1" lang="ja-JP" altLang="en-US"/>
           </a:p>
@@ -3337,7 +3337,7 @@
           <a:p>
             <a:fld id="{4A801117-FCED-794E-BE88-16E7FC9A3D9F}" type="datetime1">
               <a:rPr kumimoji="1" lang="ja-JP" altLang="en-US" smtClean="0"/>
-              <a:t>2020/4/15</a:t>
+              <a:t>2020/4/19</a:t>
             </a:fld>
             <a:endParaRPr kumimoji="1" lang="ja-JP" altLang="en-US"/>
           </a:p>
@@ -3828,7 +3828,7 @@
             <a:pPr algn="ctr"/>
             <a:r>
               <a:rPr kumimoji="1" lang="en-US" altLang="ja-JP" dirty="0"/>
-              <a:t>2019/11/12</a:t>
+              <a:t>2020/4/20</a:t>
             </a:r>
             <a:endParaRPr kumimoji="1" lang="ja-JP" altLang="en-US" dirty="0"/>
           </a:p>

</xml_diff>